<commit_message>
Update view overview diagram
Having some elements grouped caused them to move when saving. Ungrouping solved the issue with everything being in the right place in the output png.
</commit_message>
<xml_diff>
--- a/diagrams/source.pptx
+++ b/diagrams/source.pptx
@@ -256,7 +256,7 @@
           <a:p>
             <a:fld id="{13FD2341-0C92-664E-BD2E-8399D083172C}" type="datetimeFigureOut">
               <a:rPr lang="en-EG" smtClean="0"/>
-              <a:t>30/06/2022</a:t>
+              <a:t>01/07/2022</a:t>
             </a:fld>
             <a:endParaRPr lang="en-EG"/>
           </a:p>
@@ -426,7 +426,7 @@
           <a:p>
             <a:fld id="{13FD2341-0C92-664E-BD2E-8399D083172C}" type="datetimeFigureOut">
               <a:rPr lang="en-EG" smtClean="0"/>
-              <a:t>30/06/2022</a:t>
+              <a:t>01/07/2022</a:t>
             </a:fld>
             <a:endParaRPr lang="en-EG"/>
           </a:p>
@@ -606,7 +606,7 @@
           <a:p>
             <a:fld id="{13FD2341-0C92-664E-BD2E-8399D083172C}" type="datetimeFigureOut">
               <a:rPr lang="en-EG" smtClean="0"/>
-              <a:t>30/06/2022</a:t>
+              <a:t>01/07/2022</a:t>
             </a:fld>
             <a:endParaRPr lang="en-EG"/>
           </a:p>
@@ -776,7 +776,7 @@
           <a:p>
             <a:fld id="{13FD2341-0C92-664E-BD2E-8399D083172C}" type="datetimeFigureOut">
               <a:rPr lang="en-EG" smtClean="0"/>
-              <a:t>30/06/2022</a:t>
+              <a:t>01/07/2022</a:t>
             </a:fld>
             <a:endParaRPr lang="en-EG"/>
           </a:p>
@@ -1020,7 +1020,7 @@
           <a:p>
             <a:fld id="{13FD2341-0C92-664E-BD2E-8399D083172C}" type="datetimeFigureOut">
               <a:rPr lang="en-EG" smtClean="0"/>
-              <a:t>30/06/2022</a:t>
+              <a:t>01/07/2022</a:t>
             </a:fld>
             <a:endParaRPr lang="en-EG"/>
           </a:p>
@@ -1252,7 +1252,7 @@
           <a:p>
             <a:fld id="{13FD2341-0C92-664E-BD2E-8399D083172C}" type="datetimeFigureOut">
               <a:rPr lang="en-EG" smtClean="0"/>
-              <a:t>30/06/2022</a:t>
+              <a:t>01/07/2022</a:t>
             </a:fld>
             <a:endParaRPr lang="en-EG"/>
           </a:p>
@@ -1619,7 +1619,7 @@
           <a:p>
             <a:fld id="{13FD2341-0C92-664E-BD2E-8399D083172C}" type="datetimeFigureOut">
               <a:rPr lang="en-EG" smtClean="0"/>
-              <a:t>30/06/2022</a:t>
+              <a:t>01/07/2022</a:t>
             </a:fld>
             <a:endParaRPr lang="en-EG"/>
           </a:p>
@@ -1737,7 +1737,7 @@
           <a:p>
             <a:fld id="{13FD2341-0C92-664E-BD2E-8399D083172C}" type="datetimeFigureOut">
               <a:rPr lang="en-EG" smtClean="0"/>
-              <a:t>30/06/2022</a:t>
+              <a:t>01/07/2022</a:t>
             </a:fld>
             <a:endParaRPr lang="en-EG"/>
           </a:p>
@@ -1832,7 +1832,7 @@
           <a:p>
             <a:fld id="{13FD2341-0C92-664E-BD2E-8399D083172C}" type="datetimeFigureOut">
               <a:rPr lang="en-EG" smtClean="0"/>
-              <a:t>30/06/2022</a:t>
+              <a:t>01/07/2022</a:t>
             </a:fld>
             <a:endParaRPr lang="en-EG"/>
           </a:p>
@@ -2109,7 +2109,7 @@
           <a:p>
             <a:fld id="{13FD2341-0C92-664E-BD2E-8399D083172C}" type="datetimeFigureOut">
               <a:rPr lang="en-EG" smtClean="0"/>
-              <a:t>30/06/2022</a:t>
+              <a:t>01/07/2022</a:t>
             </a:fld>
             <a:endParaRPr lang="en-EG"/>
           </a:p>
@@ -2366,7 +2366,7 @@
           <a:p>
             <a:fld id="{13FD2341-0C92-664E-BD2E-8399D083172C}" type="datetimeFigureOut">
               <a:rPr lang="en-EG" smtClean="0"/>
-              <a:t>30/06/2022</a:t>
+              <a:t>01/07/2022</a:t>
             </a:fld>
             <a:endParaRPr lang="en-EG"/>
           </a:p>
@@ -2579,7 +2579,7 @@
           <a:p>
             <a:fld id="{13FD2341-0C92-664E-BD2E-8399D083172C}" type="datetimeFigureOut">
               <a:rPr lang="en-EG" smtClean="0"/>
-              <a:t>30/06/2022</a:t>
+              <a:t>01/07/2022</a:t>
             </a:fld>
             <a:endParaRPr lang="en-EG"/>
           </a:p>
@@ -6102,284 +6102,268 @@
           <a:chExt cx="0" cy="0"/>
         </a:xfrm>
       </p:grpSpPr>
-      <p:grpSp>
-        <p:nvGrpSpPr>
-          <p:cNvPr id="10" name="Group 9">
+      <p:sp>
+        <p:nvSpPr>
+          <p:cNvPr id="59" name="Rounded Rectangle 58">
             <a:extLst>
               <a:ext uri="{FF2B5EF4-FFF2-40B4-BE49-F238E27FC236}">
-                <a16:creationId xmlns:a16="http://schemas.microsoft.com/office/drawing/2014/main" id="{A3910A0D-FFAD-36E3-60CE-F342AC86F2A1}"/>
+                <a16:creationId xmlns:a16="http://schemas.microsoft.com/office/drawing/2014/main" id="{5C8842D5-E9DB-428C-C4EF-13966BABDD9D}"/>
               </a:ext>
             </a:extLst>
           </p:cNvPr>
-          <p:cNvGrpSpPr/>
+          <p:cNvSpPr/>
           <p:nvPr/>
-        </p:nvGrpSpPr>
-        <p:grpSpPr>
+        </p:nvSpPr>
+        <p:spPr>
           <a:xfrm>
             <a:off x="4761054" y="1223524"/>
-            <a:ext cx="2951095" cy="3359965"/>
-            <a:chOff x="4243137" y="1218034"/>
-            <a:chExt cx="4168865" cy="3386051"/>
-          </a:xfrm>
+            <a:ext cx="2951095" cy="3359964"/>
+          </a:xfrm>
+          <a:prstGeom prst="roundRect">
+            <a:avLst>
+              <a:gd name="adj" fmla="val 1516"/>
+            </a:avLst>
+          </a:prstGeom>
           <a:solidFill>
             <a:srgbClr val="F3E2FF"/>
           </a:solidFill>
-        </p:grpSpPr>
-        <p:sp>
-          <p:nvSpPr>
-            <p:cNvPr id="59" name="Rounded Rectangle 58">
-              <a:extLst>
-                <a:ext uri="{FF2B5EF4-FFF2-40B4-BE49-F238E27FC236}">
-                  <a16:creationId xmlns:a16="http://schemas.microsoft.com/office/drawing/2014/main" id="{5C8842D5-E9DB-428C-C4EF-13966BABDD9D}"/>
-                </a:ext>
-              </a:extLst>
-            </p:cNvPr>
-            <p:cNvSpPr/>
-            <p:nvPr/>
-          </p:nvSpPr>
-          <p:spPr>
-            <a:xfrm>
-              <a:off x="4243137" y="1218034"/>
-              <a:ext cx="4168865" cy="3386050"/>
-            </a:xfrm>
-            <a:prstGeom prst="roundRect">
-              <a:avLst>
-                <a:gd name="adj" fmla="val 1516"/>
-              </a:avLst>
-            </a:prstGeom>
-            <a:grpFill/>
-            <a:ln w="38100">
-              <a:solidFill>
-                <a:srgbClr val="7030A0"/>
-              </a:solidFill>
-            </a:ln>
-          </p:spPr>
-          <p:style>
-            <a:lnRef idx="2">
-              <a:schemeClr val="accent4">
-                <a:shade val="50000"/>
-              </a:schemeClr>
-            </a:lnRef>
-            <a:fillRef idx="1">
-              <a:schemeClr val="accent4"/>
-            </a:fillRef>
-            <a:effectRef idx="0">
-              <a:schemeClr val="accent4"/>
-            </a:effectRef>
-            <a:fontRef idx="minor">
-              <a:schemeClr val="lt1"/>
-            </a:fontRef>
-          </p:style>
-          <p:txBody>
-            <a:bodyPr rtlCol="0" anchor="t" anchorCtr="0"/>
-            <a:lstStyle/>
-            <a:p>
-              <a:pPr algn="ctr"/>
-              <a:endParaRPr lang="en-EG" sz="1100" dirty="0"/>
-            </a:p>
-          </p:txBody>
-        </p:sp>
-        <p:sp>
-          <p:nvSpPr>
-            <p:cNvPr id="51" name="Rounded Rectangle 50">
-              <a:extLst>
-                <a:ext uri="{FF2B5EF4-FFF2-40B4-BE49-F238E27FC236}">
-                  <a16:creationId xmlns:a16="http://schemas.microsoft.com/office/drawing/2014/main" id="{D1781516-6F38-D9DB-7486-57269B7833AF}"/>
-                </a:ext>
-              </a:extLst>
-            </p:cNvPr>
-            <p:cNvSpPr/>
-            <p:nvPr/>
-          </p:nvSpPr>
-          <p:spPr>
-            <a:xfrm>
-              <a:off x="4243138" y="1820780"/>
-              <a:ext cx="1034716" cy="2783305"/>
-            </a:xfrm>
-            <a:prstGeom prst="roundRect">
-              <a:avLst>
-                <a:gd name="adj" fmla="val 1516"/>
-              </a:avLst>
-            </a:prstGeom>
-            <a:grpFill/>
-            <a:ln w="38100">
-              <a:solidFill>
-                <a:srgbClr val="7030A0"/>
-              </a:solidFill>
-            </a:ln>
-          </p:spPr>
-          <p:style>
-            <a:lnRef idx="2">
-              <a:schemeClr val="accent4">
-                <a:shade val="50000"/>
-              </a:schemeClr>
-            </a:lnRef>
-            <a:fillRef idx="1">
-              <a:schemeClr val="accent4"/>
-            </a:fillRef>
-            <a:effectRef idx="0">
-              <a:schemeClr val="accent4"/>
-            </a:effectRef>
-            <a:fontRef idx="minor">
-              <a:schemeClr val="lt1"/>
-            </a:fontRef>
-          </p:style>
-          <p:txBody>
-            <a:bodyPr rtlCol="0" anchor="t" anchorCtr="0"/>
-            <a:lstStyle/>
-            <a:p>
-              <a:pPr algn="ctr"/>
-              <a:r>
-                <a:rPr lang="en-US" sz="1200" dirty="0">
-                  <a:solidFill>
-                    <a:schemeClr val="tx1">
-                      <a:lumMod val="85000"/>
-                      <a:lumOff val="15000"/>
-                    </a:schemeClr>
-                  </a:solidFill>
-                </a:rPr>
-                <a:t>#sidebar</a:t>
-              </a:r>
-              <a:endParaRPr lang="en-EG" sz="1200" dirty="0">
+          <a:ln w="38100">
+            <a:solidFill>
+              <a:srgbClr val="7030A0"/>
+            </a:solidFill>
+          </a:ln>
+        </p:spPr>
+        <p:style>
+          <a:lnRef idx="2">
+            <a:schemeClr val="accent4">
+              <a:shade val="50000"/>
+            </a:schemeClr>
+          </a:lnRef>
+          <a:fillRef idx="1">
+            <a:schemeClr val="accent4"/>
+          </a:fillRef>
+          <a:effectRef idx="0">
+            <a:schemeClr val="accent4"/>
+          </a:effectRef>
+          <a:fontRef idx="minor">
+            <a:schemeClr val="lt1"/>
+          </a:fontRef>
+        </p:style>
+        <p:txBody>
+          <a:bodyPr rtlCol="0" anchor="t" anchorCtr="0"/>
+          <a:lstStyle/>
+          <a:p>
+            <a:pPr algn="ctr"/>
+            <a:endParaRPr lang="en-EG" sz="1100" dirty="0"/>
+          </a:p>
+        </p:txBody>
+      </p:sp>
+      <p:sp>
+        <p:nvSpPr>
+          <p:cNvPr id="51" name="Rounded Rectangle 50">
+            <a:extLst>
+              <a:ext uri="{FF2B5EF4-FFF2-40B4-BE49-F238E27FC236}">
+                <a16:creationId xmlns:a16="http://schemas.microsoft.com/office/drawing/2014/main" id="{D1781516-6F38-D9DB-7486-57269B7833AF}"/>
+              </a:ext>
+            </a:extLst>
+          </p:cNvPr>
+          <p:cNvSpPr/>
+          <p:nvPr/>
+        </p:nvSpPr>
+        <p:spPr>
+          <a:xfrm>
+            <a:off x="4761055" y="1821626"/>
+            <a:ext cx="732464" cy="2761863"/>
+          </a:xfrm>
+          <a:prstGeom prst="roundRect">
+            <a:avLst>
+              <a:gd name="adj" fmla="val 1516"/>
+            </a:avLst>
+          </a:prstGeom>
+          <a:solidFill>
+            <a:srgbClr val="F3E2FF"/>
+          </a:solidFill>
+          <a:ln w="38100">
+            <a:solidFill>
+              <a:srgbClr val="7030A0"/>
+            </a:solidFill>
+          </a:ln>
+        </p:spPr>
+        <p:style>
+          <a:lnRef idx="2">
+            <a:schemeClr val="accent4">
+              <a:shade val="50000"/>
+            </a:schemeClr>
+          </a:lnRef>
+          <a:fillRef idx="1">
+            <a:schemeClr val="accent4"/>
+          </a:fillRef>
+          <a:effectRef idx="0">
+            <a:schemeClr val="accent4"/>
+          </a:effectRef>
+          <a:fontRef idx="minor">
+            <a:schemeClr val="lt1"/>
+          </a:fontRef>
+        </p:style>
+        <p:txBody>
+          <a:bodyPr rtlCol="0" anchor="t" anchorCtr="0"/>
+          <a:lstStyle/>
+          <a:p>
+            <a:pPr algn="ctr"/>
+            <a:r>
+              <a:rPr lang="en-US" sz="1200" dirty="0">
                 <a:solidFill>
                   <a:schemeClr val="tx1">
                     <a:lumMod val="85000"/>
                     <a:lumOff val="15000"/>
                   </a:schemeClr>
                 </a:solidFill>
-              </a:endParaRPr>
-            </a:p>
-          </p:txBody>
-        </p:sp>
-        <p:sp>
-          <p:nvSpPr>
-            <p:cNvPr id="52" name="Rounded Rectangle 51">
-              <a:extLst>
-                <a:ext uri="{FF2B5EF4-FFF2-40B4-BE49-F238E27FC236}">
-                  <a16:creationId xmlns:a16="http://schemas.microsoft.com/office/drawing/2014/main" id="{F88736A0-5B0D-AF31-CD5F-4483BEDEF133}"/>
-                </a:ext>
-              </a:extLst>
-            </p:cNvPr>
-            <p:cNvSpPr/>
-            <p:nvPr/>
-          </p:nvSpPr>
-          <p:spPr>
-            <a:xfrm>
-              <a:off x="4243138" y="1218034"/>
-              <a:ext cx="4168864" cy="602745"/>
-            </a:xfrm>
-            <a:prstGeom prst="roundRect">
-              <a:avLst>
-                <a:gd name="adj" fmla="val 1516"/>
-              </a:avLst>
-            </a:prstGeom>
-            <a:grpFill/>
-            <a:ln w="38100">
+              </a:rPr>
+              <a:t>#sidebar</a:t>
+            </a:r>
+            <a:endParaRPr lang="en-EG" sz="1200" dirty="0">
               <a:solidFill>
-                <a:srgbClr val="7030A0"/>
+                <a:schemeClr val="tx1">
+                  <a:lumMod val="85000"/>
+                  <a:lumOff val="15000"/>
+                </a:schemeClr>
               </a:solidFill>
-            </a:ln>
-          </p:spPr>
-          <p:style>
-            <a:lnRef idx="2">
-              <a:schemeClr val="accent4">
-                <a:shade val="50000"/>
-              </a:schemeClr>
-            </a:lnRef>
-            <a:fillRef idx="1">
-              <a:schemeClr val="accent4"/>
-            </a:fillRef>
-            <a:effectRef idx="0">
-              <a:schemeClr val="accent4"/>
-            </a:effectRef>
-            <a:fontRef idx="minor">
-              <a:schemeClr val="lt1"/>
-            </a:fontRef>
-          </p:style>
-          <p:txBody>
-            <a:bodyPr rtlCol="0" anchor="t" anchorCtr="0"/>
-            <a:lstStyle/>
-            <a:p>
-              <a:pPr algn="ctr"/>
-              <a:r>
-                <a:rPr lang="en-EG" sz="1200" dirty="0">
-                  <a:solidFill>
-                    <a:schemeClr val="tx1">
-                      <a:lumMod val="85000"/>
-                      <a:lumOff val="15000"/>
-                    </a:schemeClr>
-                  </a:solidFill>
-                </a:rPr>
-                <a:t>#header</a:t>
-              </a:r>
-            </a:p>
-          </p:txBody>
-        </p:sp>
-        <p:sp>
-          <p:nvSpPr>
-            <p:cNvPr id="53" name="Rounded Rectangle 52">
-              <a:extLst>
-                <a:ext uri="{FF2B5EF4-FFF2-40B4-BE49-F238E27FC236}">
-                  <a16:creationId xmlns:a16="http://schemas.microsoft.com/office/drawing/2014/main" id="{D8024579-008F-C602-1127-5EE93B9B659D}"/>
-                </a:ext>
-              </a:extLst>
-            </p:cNvPr>
-            <p:cNvSpPr/>
-            <p:nvPr/>
-          </p:nvSpPr>
-          <p:spPr>
-            <a:xfrm>
-              <a:off x="5292852" y="1820780"/>
-              <a:ext cx="3119149" cy="2783304"/>
-            </a:xfrm>
-            <a:prstGeom prst="roundRect">
-              <a:avLst>
-                <a:gd name="adj" fmla="val 1516"/>
-              </a:avLst>
-            </a:prstGeom>
-            <a:grpFill/>
-            <a:ln w="38100">
-              <a:solidFill>
-                <a:srgbClr val="7030A0"/>
-              </a:solidFill>
-            </a:ln>
-          </p:spPr>
-          <p:style>
-            <a:lnRef idx="2">
-              <a:schemeClr val="accent4">
-                <a:shade val="50000"/>
-              </a:schemeClr>
-            </a:lnRef>
-            <a:fillRef idx="1">
-              <a:schemeClr val="accent4"/>
-            </a:fillRef>
-            <a:effectRef idx="0">
-              <a:schemeClr val="accent4"/>
-            </a:effectRef>
-            <a:fontRef idx="minor">
-              <a:schemeClr val="lt1"/>
-            </a:fontRef>
-          </p:style>
-          <p:txBody>
-            <a:bodyPr rtlCol="0" anchor="t" anchorCtr="0"/>
-            <a:lstStyle/>
-            <a:p>
-              <a:pPr algn="ctr"/>
-              <a:r>
-                <a:rPr lang="en-EG" sz="1200" dirty="0">
-                  <a:solidFill>
-                    <a:schemeClr val="tx1">
-                      <a:lumMod val="85000"/>
-                      <a:lumOff val="15000"/>
-                    </a:schemeClr>
-                  </a:solidFill>
-                </a:rPr>
-                <a:t>main</a:t>
-              </a:r>
-            </a:p>
-          </p:txBody>
-        </p:sp>
-      </p:grpSp>
+            </a:endParaRPr>
+          </a:p>
+        </p:txBody>
+      </p:sp>
+      <p:sp>
+        <p:nvSpPr>
+          <p:cNvPr id="52" name="Rounded Rectangle 51">
+            <a:extLst>
+              <a:ext uri="{FF2B5EF4-FFF2-40B4-BE49-F238E27FC236}">
+                <a16:creationId xmlns:a16="http://schemas.microsoft.com/office/drawing/2014/main" id="{F88736A0-5B0D-AF31-CD5F-4483BEDEF133}"/>
+              </a:ext>
+            </a:extLst>
+          </p:cNvPr>
+          <p:cNvSpPr/>
+          <p:nvPr/>
+        </p:nvSpPr>
+        <p:spPr>
+          <a:xfrm>
+            <a:off x="4761055" y="1223524"/>
+            <a:ext cx="2951094" cy="598101"/>
+          </a:xfrm>
+          <a:prstGeom prst="roundRect">
+            <a:avLst>
+              <a:gd name="adj" fmla="val 1516"/>
+            </a:avLst>
+          </a:prstGeom>
+          <a:solidFill>
+            <a:srgbClr val="F3E2FF"/>
+          </a:solidFill>
+          <a:ln w="38100">
+            <a:solidFill>
+              <a:srgbClr val="7030A0"/>
+            </a:solidFill>
+          </a:ln>
+        </p:spPr>
+        <p:style>
+          <a:lnRef idx="2">
+            <a:schemeClr val="accent4">
+              <a:shade val="50000"/>
+            </a:schemeClr>
+          </a:lnRef>
+          <a:fillRef idx="1">
+            <a:schemeClr val="accent4"/>
+          </a:fillRef>
+          <a:effectRef idx="0">
+            <a:schemeClr val="accent4"/>
+          </a:effectRef>
+          <a:fontRef idx="minor">
+            <a:schemeClr val="lt1"/>
+          </a:fontRef>
+        </p:style>
+        <p:txBody>
+          <a:bodyPr rtlCol="0" anchor="t" anchorCtr="0"/>
+          <a:lstStyle/>
+          <a:p>
+            <a:pPr algn="ctr"/>
+            <a:r>
+              <a:rPr lang="en-EG" sz="1200" dirty="0">
+                <a:solidFill>
+                  <a:schemeClr val="tx1">
+                    <a:lumMod val="85000"/>
+                    <a:lumOff val="15000"/>
+                  </a:schemeClr>
+                </a:solidFill>
+              </a:rPr>
+              <a:t>#header</a:t>
+            </a:r>
+          </a:p>
+        </p:txBody>
+      </p:sp>
+      <p:sp>
+        <p:nvSpPr>
+          <p:cNvPr id="53" name="Rounded Rectangle 52">
+            <a:extLst>
+              <a:ext uri="{FF2B5EF4-FFF2-40B4-BE49-F238E27FC236}">
+                <a16:creationId xmlns:a16="http://schemas.microsoft.com/office/drawing/2014/main" id="{D8024579-008F-C602-1127-5EE93B9B659D}"/>
+              </a:ext>
+            </a:extLst>
+          </p:cNvPr>
+          <p:cNvSpPr/>
+          <p:nvPr/>
+        </p:nvSpPr>
+        <p:spPr>
+          <a:xfrm>
+            <a:off x="5504136" y="1821626"/>
+            <a:ext cx="2208012" cy="2761862"/>
+          </a:xfrm>
+          <a:prstGeom prst="roundRect">
+            <a:avLst>
+              <a:gd name="adj" fmla="val 1516"/>
+            </a:avLst>
+          </a:prstGeom>
+          <a:solidFill>
+            <a:srgbClr val="F3E2FF"/>
+          </a:solidFill>
+          <a:ln w="38100">
+            <a:solidFill>
+              <a:srgbClr val="7030A0"/>
+            </a:solidFill>
+          </a:ln>
+        </p:spPr>
+        <p:style>
+          <a:lnRef idx="2">
+            <a:schemeClr val="accent4">
+              <a:shade val="50000"/>
+            </a:schemeClr>
+          </a:lnRef>
+          <a:fillRef idx="1">
+            <a:schemeClr val="accent4"/>
+          </a:fillRef>
+          <a:effectRef idx="0">
+            <a:schemeClr val="accent4"/>
+          </a:effectRef>
+          <a:fontRef idx="minor">
+            <a:schemeClr val="lt1"/>
+          </a:fontRef>
+        </p:style>
+        <p:txBody>
+          <a:bodyPr rtlCol="0" anchor="t" anchorCtr="0"/>
+          <a:lstStyle/>
+          <a:p>
+            <a:pPr algn="ctr"/>
+            <a:r>
+              <a:rPr lang="en-EG" sz="1200" dirty="0">
+                <a:solidFill>
+                  <a:schemeClr val="tx1">
+                    <a:lumMod val="85000"/>
+                    <a:lumOff val="15000"/>
+                  </a:schemeClr>
+                </a:solidFill>
+              </a:rPr>
+              <a:t>main</a:t>
+            </a:r>
+          </a:p>
+        </p:txBody>
+      </p:sp>
       <p:sp>
         <p:nvSpPr>
           <p:cNvPr id="56" name="Rounded Rectangle 55">
@@ -7242,375 +7226,354 @@
           </a:p>
         </p:txBody>
       </p:sp>
-      <p:grpSp>
-        <p:nvGrpSpPr>
-          <p:cNvPr id="26" name="Group 25">
+      <p:sp>
+        <p:nvSpPr>
+          <p:cNvPr id="86" name="Rounded Rectangle 85">
             <a:extLst>
               <a:ext uri="{FF2B5EF4-FFF2-40B4-BE49-F238E27FC236}">
-                <a16:creationId xmlns:a16="http://schemas.microsoft.com/office/drawing/2014/main" id="{EDA23B68-D6B6-6BCC-4952-D5F9B677F931}"/>
+                <a16:creationId xmlns:a16="http://schemas.microsoft.com/office/drawing/2014/main" id="{CBDFB369-9073-8F47-66CE-4DB87F14068F}"/>
               </a:ext>
             </a:extLst>
           </p:cNvPr>
-          <p:cNvGrpSpPr/>
+          <p:cNvSpPr/>
           <p:nvPr/>
-        </p:nvGrpSpPr>
-        <p:grpSpPr>
+        </p:nvSpPr>
+        <p:spPr>
           <a:xfrm>
             <a:off x="2362449" y="3115416"/>
             <a:ext cx="2169445" cy="1400177"/>
-            <a:chOff x="2362449" y="3035206"/>
-            <a:chExt cx="2169445" cy="1400177"/>
-          </a:xfrm>
-        </p:grpSpPr>
-        <p:sp>
-          <p:nvSpPr>
-            <p:cNvPr id="86" name="Rounded Rectangle 85">
-              <a:extLst>
-                <a:ext uri="{FF2B5EF4-FFF2-40B4-BE49-F238E27FC236}">
-                  <a16:creationId xmlns:a16="http://schemas.microsoft.com/office/drawing/2014/main" id="{CBDFB369-9073-8F47-66CE-4DB87F14068F}"/>
-                </a:ext>
-              </a:extLst>
-            </p:cNvPr>
-            <p:cNvSpPr/>
-            <p:nvPr/>
-          </p:nvSpPr>
-          <p:spPr>
-            <a:xfrm>
-              <a:off x="2362449" y="3035206"/>
-              <a:ext cx="2169445" cy="1400177"/>
-            </a:xfrm>
-            <a:prstGeom prst="roundRect">
-              <a:avLst>
-                <a:gd name="adj" fmla="val 8443"/>
-              </a:avLst>
-            </a:prstGeom>
-            <a:solidFill>
-              <a:schemeClr val="accent2">
-                <a:lumMod val="40000"/>
-                <a:lumOff val="60000"/>
-              </a:schemeClr>
-            </a:solidFill>
-            <a:ln>
-              <a:noFill/>
-            </a:ln>
-          </p:spPr>
-          <p:style>
-            <a:lnRef idx="2">
-              <a:schemeClr val="accent4">
-                <a:shade val="50000"/>
-              </a:schemeClr>
-            </a:lnRef>
-            <a:fillRef idx="1">
-              <a:schemeClr val="accent4"/>
-            </a:fillRef>
-            <a:effectRef idx="0">
-              <a:schemeClr val="accent4"/>
-            </a:effectRef>
-            <a:fontRef idx="minor">
-              <a:schemeClr val="lt1"/>
-            </a:fontRef>
-          </p:style>
-          <p:txBody>
-            <a:bodyPr rtlCol="0" anchor="t" anchorCtr="0"/>
-            <a:lstStyle/>
-            <a:p>
-              <a:pPr algn="ctr"/>
-              <a:r>
-                <a:rPr lang="en-EG" sz="1000" dirty="0">
-                  <a:solidFill>
-                    <a:schemeClr val="tx1"/>
-                  </a:solidFill>
-                </a:rPr>
-                <a:t>Convert Element</a:t>
-              </a:r>
-              <a:endParaRPr lang="en-EG" sz="900" dirty="0">
+          </a:xfrm>
+          <a:prstGeom prst="roundRect">
+            <a:avLst>
+              <a:gd name="adj" fmla="val 8443"/>
+            </a:avLst>
+          </a:prstGeom>
+          <a:solidFill>
+            <a:schemeClr val="accent2">
+              <a:lumMod val="40000"/>
+              <a:lumOff val="60000"/>
+            </a:schemeClr>
+          </a:solidFill>
+          <a:ln>
+            <a:noFill/>
+          </a:ln>
+        </p:spPr>
+        <p:style>
+          <a:lnRef idx="2">
+            <a:schemeClr val="accent4">
+              <a:shade val="50000"/>
+            </a:schemeClr>
+          </a:lnRef>
+          <a:fillRef idx="1">
+            <a:schemeClr val="accent4"/>
+          </a:fillRef>
+          <a:effectRef idx="0">
+            <a:schemeClr val="accent4"/>
+          </a:effectRef>
+          <a:fontRef idx="minor">
+            <a:schemeClr val="lt1"/>
+          </a:fontRef>
+        </p:style>
+        <p:txBody>
+          <a:bodyPr rtlCol="0" anchor="t" anchorCtr="0"/>
+          <a:lstStyle/>
+          <a:p>
+            <a:pPr algn="ctr"/>
+            <a:r>
+              <a:rPr lang="en-EG" sz="1000" dirty="0">
                 <a:solidFill>
                   <a:schemeClr val="tx1"/>
                 </a:solidFill>
-              </a:endParaRPr>
-            </a:p>
-            <a:p>
-              <a:endParaRPr lang="en-EG" sz="900" dirty="0">
+              </a:rPr>
+              <a:t>Convert Element</a:t>
+            </a:r>
+            <a:endParaRPr lang="en-EG" sz="900" dirty="0">
+              <a:solidFill>
+                <a:schemeClr val="tx1"/>
+              </a:solidFill>
+            </a:endParaRPr>
+          </a:p>
+          <a:p>
+            <a:endParaRPr lang="en-EG" sz="900" dirty="0">
+              <a:solidFill>
+                <a:schemeClr val="tx1">
+                  <a:lumMod val="85000"/>
+                  <a:lumOff val="15000"/>
+                </a:schemeClr>
+              </a:solidFill>
+            </a:endParaRPr>
+          </a:p>
+          <a:p>
+            <a:pPr>
+              <a:lnSpc>
+                <a:spcPts val="1200"/>
+              </a:lnSpc>
+            </a:pPr>
+            <a:r>
+              <a:rPr lang="en-EG" sz="900" dirty="0">
                 <a:solidFill>
                   <a:schemeClr val="tx1">
                     <a:lumMod val="85000"/>
                     <a:lumOff val="15000"/>
                   </a:schemeClr>
                 </a:solidFill>
-              </a:endParaRPr>
-            </a:p>
-            <a:p>
-              <a:pPr>
-                <a:lnSpc>
-                  <a:spcPts val="1200"/>
-                </a:lnSpc>
-              </a:pPr>
-              <a:r>
-                <a:rPr lang="en-EG" sz="900" dirty="0">
-                  <a:solidFill>
-                    <a:schemeClr val="tx1">
-                      <a:lumMod val="85000"/>
-                      <a:lumOff val="15000"/>
-                    </a:schemeClr>
-                  </a:solidFill>
-                </a:rPr>
-                <a:t>convert (                              ) {</a:t>
-              </a:r>
-            </a:p>
-            <a:p>
-              <a:pPr lvl="1" indent="-274638">
-                <a:lnSpc>
-                  <a:spcPts val="1200"/>
-                </a:lnSpc>
-              </a:pPr>
-              <a:r>
-                <a:rPr lang="en-US" sz="900" dirty="0">
-                  <a:solidFill>
-                    <a:schemeClr val="tx1">
-                      <a:lumMod val="85000"/>
-                      <a:lumOff val="15000"/>
-                    </a:schemeClr>
-                  </a:solidFill>
-                </a:rPr>
-                <a:t>// Create element</a:t>
-              </a:r>
-            </a:p>
-            <a:p>
-              <a:pPr lvl="1" indent="-274638">
-                <a:lnSpc>
-                  <a:spcPts val="1200"/>
-                </a:lnSpc>
-              </a:pPr>
-              <a:r>
-                <a:rPr lang="en-US" sz="900" dirty="0">
-                  <a:solidFill>
-                    <a:schemeClr val="tx1">
-                      <a:lumMod val="85000"/>
-                      <a:lumOff val="15000"/>
-                    </a:schemeClr>
-                  </a:solidFill>
-                </a:rPr>
-                <a:t>//  Set inner HTML to </a:t>
-              </a:r>
-            </a:p>
-            <a:p>
-              <a:pPr lvl="1" indent="-274638">
-                <a:lnSpc>
-                  <a:spcPts val="1200"/>
-                </a:lnSpc>
-              </a:pPr>
-              <a:r>
-                <a:rPr lang="en-EG" sz="900" dirty="0">
-                  <a:solidFill>
-                    <a:schemeClr val="tx1">
-                      <a:lumMod val="85000"/>
-                      <a:lumOff val="15000"/>
-                    </a:schemeClr>
-                  </a:solidFill>
-                </a:rPr>
-                <a:t>// return first child as </a:t>
-              </a:r>
-            </a:p>
-            <a:p>
-              <a:pPr lvl="1" indent="-449263">
-                <a:lnSpc>
-                  <a:spcPts val="1200"/>
-                </a:lnSpc>
-              </a:pPr>
-              <a:r>
-                <a:rPr lang="en-EG" sz="900" dirty="0">
-                  <a:solidFill>
-                    <a:schemeClr val="tx1">
-                      <a:lumMod val="85000"/>
-                      <a:lumOff val="15000"/>
-                    </a:schemeClr>
-                  </a:solidFill>
-                </a:rPr>
-                <a:t>}</a:t>
-              </a:r>
-            </a:p>
-            <a:p>
-              <a:endParaRPr lang="en-EG" sz="900" dirty="0">
+              </a:rPr>
+              <a:t>convert (                              ) {</a:t>
+            </a:r>
+          </a:p>
+          <a:p>
+            <a:pPr lvl="1" indent="-274638">
+              <a:lnSpc>
+                <a:spcPts val="1200"/>
+              </a:lnSpc>
+            </a:pPr>
+            <a:r>
+              <a:rPr lang="en-US" sz="900" dirty="0">
                 <a:solidFill>
                   <a:schemeClr val="tx1">
                     <a:lumMod val="85000"/>
                     <a:lumOff val="15000"/>
                   </a:schemeClr>
                 </a:solidFill>
-              </a:endParaRPr>
-            </a:p>
-          </p:txBody>
-        </p:sp>
-        <p:sp>
-          <p:nvSpPr>
-            <p:cNvPr id="92" name="Rounded Rectangle 91">
-              <a:extLst>
-                <a:ext uri="{FF2B5EF4-FFF2-40B4-BE49-F238E27FC236}">
-                  <a16:creationId xmlns:a16="http://schemas.microsoft.com/office/drawing/2014/main" id="{26F5E0E3-0E4D-FA6D-7140-4D434963416C}"/>
-                </a:ext>
-              </a:extLst>
-            </p:cNvPr>
-            <p:cNvSpPr/>
-            <p:nvPr/>
-          </p:nvSpPr>
-          <p:spPr>
-            <a:xfrm>
-              <a:off x="2916762" y="3410969"/>
-              <a:ext cx="724476" cy="164910"/>
-            </a:xfrm>
-            <a:prstGeom prst="roundRect">
-              <a:avLst/>
-            </a:prstGeom>
-            <a:solidFill>
-              <a:schemeClr val="accent2">
-                <a:lumMod val="75000"/>
-              </a:schemeClr>
-            </a:solidFill>
-            <a:ln>
-              <a:noFill/>
-            </a:ln>
-          </p:spPr>
-          <p:style>
-            <a:lnRef idx="2">
-              <a:schemeClr val="accent4">
-                <a:shade val="50000"/>
-              </a:schemeClr>
-            </a:lnRef>
-            <a:fillRef idx="1">
-              <a:schemeClr val="accent4"/>
-            </a:fillRef>
-            <a:effectRef idx="0">
-              <a:schemeClr val="accent4"/>
-            </a:effectRef>
-            <a:fontRef idx="minor">
-              <a:schemeClr val="lt1"/>
-            </a:fontRef>
-          </p:style>
-          <p:txBody>
-            <a:bodyPr lIns="0" tIns="0" rIns="0" bIns="0" rtlCol="0" anchor="ctr"/>
-            <a:lstStyle/>
-            <a:p>
-              <a:pPr algn="ctr"/>
-              <a:r>
-                <a:rPr lang="en-EG" sz="900" dirty="0"/>
-                <a:t>elementHTML</a:t>
-              </a:r>
-            </a:p>
-          </p:txBody>
-        </p:sp>
-        <p:sp>
-          <p:nvSpPr>
-            <p:cNvPr id="94" name="Rounded Rectangle 93">
-              <a:extLst>
-                <a:ext uri="{FF2B5EF4-FFF2-40B4-BE49-F238E27FC236}">
-                  <a16:creationId xmlns:a16="http://schemas.microsoft.com/office/drawing/2014/main" id="{98F2398A-3A46-5184-B084-9313FC651481}"/>
-                </a:ext>
-              </a:extLst>
-            </p:cNvPr>
-            <p:cNvSpPr/>
-            <p:nvPr/>
-          </p:nvSpPr>
-          <p:spPr>
-            <a:xfrm>
-              <a:off x="3689685" y="3870429"/>
-              <a:ext cx="529389" cy="164910"/>
-            </a:xfrm>
-            <a:prstGeom prst="roundRect">
-              <a:avLst/>
-            </a:prstGeom>
-            <a:solidFill>
-              <a:srgbClr val="FF0000"/>
-            </a:solidFill>
-            <a:ln>
-              <a:noFill/>
-            </a:ln>
-          </p:spPr>
-          <p:style>
-            <a:lnRef idx="2">
-              <a:schemeClr val="accent4">
-                <a:shade val="50000"/>
-              </a:schemeClr>
-            </a:lnRef>
-            <a:fillRef idx="1">
-              <a:schemeClr val="accent4"/>
-            </a:fillRef>
-            <a:effectRef idx="0">
-              <a:schemeClr val="accent4"/>
-            </a:effectRef>
-            <a:fontRef idx="minor">
-              <a:schemeClr val="lt1"/>
-            </a:fontRef>
-          </p:style>
-          <p:txBody>
-            <a:bodyPr lIns="0" tIns="0" rIns="0" bIns="0" rtlCol="0" anchor="ctr"/>
-            <a:lstStyle/>
-            <a:p>
-              <a:pPr algn="ctr"/>
-              <a:r>
-                <a:rPr lang="en-EG" sz="900" dirty="0"/>
-                <a:t>Element</a:t>
-              </a:r>
-            </a:p>
-          </p:txBody>
-        </p:sp>
-        <p:sp>
-          <p:nvSpPr>
-            <p:cNvPr id="95" name="Rounded Rectangle 94">
-              <a:extLst>
-                <a:ext uri="{FF2B5EF4-FFF2-40B4-BE49-F238E27FC236}">
-                  <a16:creationId xmlns:a16="http://schemas.microsoft.com/office/drawing/2014/main" id="{FAB453D1-03BF-5BCF-8ECB-F71B5DDD377C}"/>
-                </a:ext>
-              </a:extLst>
-            </p:cNvPr>
-            <p:cNvSpPr/>
-            <p:nvPr/>
-          </p:nvSpPr>
-          <p:spPr>
-            <a:xfrm>
-              <a:off x="3677792" y="3684924"/>
-              <a:ext cx="724476" cy="164910"/>
-            </a:xfrm>
-            <a:prstGeom prst="roundRect">
-              <a:avLst/>
-            </a:prstGeom>
-            <a:solidFill>
-              <a:schemeClr val="accent2">
-                <a:lumMod val="75000"/>
-              </a:schemeClr>
-            </a:solidFill>
-            <a:ln>
-              <a:noFill/>
-            </a:ln>
-          </p:spPr>
-          <p:style>
-            <a:lnRef idx="2">
-              <a:schemeClr val="accent4">
-                <a:shade val="50000"/>
-              </a:schemeClr>
-            </a:lnRef>
-            <a:fillRef idx="1">
-              <a:schemeClr val="accent4"/>
-            </a:fillRef>
-            <a:effectRef idx="0">
-              <a:schemeClr val="accent4"/>
-            </a:effectRef>
-            <a:fontRef idx="minor">
-              <a:schemeClr val="lt1"/>
-            </a:fontRef>
-          </p:style>
-          <p:txBody>
-            <a:bodyPr lIns="0" tIns="0" rIns="0" bIns="0" rtlCol="0" anchor="ctr"/>
-            <a:lstStyle/>
-            <a:p>
-              <a:pPr algn="ctr"/>
-              <a:r>
-                <a:rPr lang="en-EG" sz="900" dirty="0"/>
-                <a:t>elementHTML</a:t>
-              </a:r>
-            </a:p>
-          </p:txBody>
-        </p:sp>
-      </p:grpSp>
+              </a:rPr>
+              <a:t>// Create element</a:t>
+            </a:r>
+          </a:p>
+          <a:p>
+            <a:pPr lvl="1" indent="-274638">
+              <a:lnSpc>
+                <a:spcPts val="1200"/>
+              </a:lnSpc>
+            </a:pPr>
+            <a:r>
+              <a:rPr lang="en-US" sz="900" dirty="0">
+                <a:solidFill>
+                  <a:schemeClr val="tx1">
+                    <a:lumMod val="85000"/>
+                    <a:lumOff val="15000"/>
+                  </a:schemeClr>
+                </a:solidFill>
+              </a:rPr>
+              <a:t>//  Set inner HTML to </a:t>
+            </a:r>
+          </a:p>
+          <a:p>
+            <a:pPr lvl="1" indent="-274638">
+              <a:lnSpc>
+                <a:spcPts val="1200"/>
+              </a:lnSpc>
+            </a:pPr>
+            <a:r>
+              <a:rPr lang="en-EG" sz="900" dirty="0">
+                <a:solidFill>
+                  <a:schemeClr val="tx1">
+                    <a:lumMod val="85000"/>
+                    <a:lumOff val="15000"/>
+                  </a:schemeClr>
+                </a:solidFill>
+              </a:rPr>
+              <a:t>// return first child as </a:t>
+            </a:r>
+          </a:p>
+          <a:p>
+            <a:pPr lvl="1" indent="-449263">
+              <a:lnSpc>
+                <a:spcPts val="1200"/>
+              </a:lnSpc>
+            </a:pPr>
+            <a:r>
+              <a:rPr lang="en-EG" sz="900" dirty="0">
+                <a:solidFill>
+                  <a:schemeClr val="tx1">
+                    <a:lumMod val="85000"/>
+                    <a:lumOff val="15000"/>
+                  </a:schemeClr>
+                </a:solidFill>
+              </a:rPr>
+              <a:t>}</a:t>
+            </a:r>
+          </a:p>
+          <a:p>
+            <a:endParaRPr lang="en-EG" sz="900" dirty="0">
+              <a:solidFill>
+                <a:schemeClr val="tx1">
+                  <a:lumMod val="85000"/>
+                  <a:lumOff val="15000"/>
+                </a:schemeClr>
+              </a:solidFill>
+            </a:endParaRPr>
+          </a:p>
+        </p:txBody>
+      </p:sp>
+      <p:sp>
+        <p:nvSpPr>
+          <p:cNvPr id="92" name="Rounded Rectangle 91">
+            <a:extLst>
+              <a:ext uri="{FF2B5EF4-FFF2-40B4-BE49-F238E27FC236}">
+                <a16:creationId xmlns:a16="http://schemas.microsoft.com/office/drawing/2014/main" id="{26F5E0E3-0E4D-FA6D-7140-4D434963416C}"/>
+              </a:ext>
+            </a:extLst>
+          </p:cNvPr>
+          <p:cNvSpPr/>
+          <p:nvPr/>
+        </p:nvSpPr>
+        <p:spPr>
+          <a:xfrm>
+            <a:off x="2916762" y="3491179"/>
+            <a:ext cx="724476" cy="164910"/>
+          </a:xfrm>
+          <a:prstGeom prst="roundRect">
+            <a:avLst/>
+          </a:prstGeom>
+          <a:solidFill>
+            <a:schemeClr val="accent2">
+              <a:lumMod val="75000"/>
+            </a:schemeClr>
+          </a:solidFill>
+          <a:ln>
+            <a:noFill/>
+          </a:ln>
+        </p:spPr>
+        <p:style>
+          <a:lnRef idx="2">
+            <a:schemeClr val="accent4">
+              <a:shade val="50000"/>
+            </a:schemeClr>
+          </a:lnRef>
+          <a:fillRef idx="1">
+            <a:schemeClr val="accent4"/>
+          </a:fillRef>
+          <a:effectRef idx="0">
+            <a:schemeClr val="accent4"/>
+          </a:effectRef>
+          <a:fontRef idx="minor">
+            <a:schemeClr val="lt1"/>
+          </a:fontRef>
+        </p:style>
+        <p:txBody>
+          <a:bodyPr lIns="0" tIns="0" rIns="0" bIns="0" rtlCol="0" anchor="ctr"/>
+          <a:lstStyle/>
+          <a:p>
+            <a:pPr algn="ctr"/>
+            <a:r>
+              <a:rPr lang="en-EG" sz="900" dirty="0"/>
+              <a:t>elementHTML</a:t>
+            </a:r>
+          </a:p>
+        </p:txBody>
+      </p:sp>
+      <p:sp>
+        <p:nvSpPr>
+          <p:cNvPr id="94" name="Rounded Rectangle 93">
+            <a:extLst>
+              <a:ext uri="{FF2B5EF4-FFF2-40B4-BE49-F238E27FC236}">
+                <a16:creationId xmlns:a16="http://schemas.microsoft.com/office/drawing/2014/main" id="{98F2398A-3A46-5184-B084-9313FC651481}"/>
+              </a:ext>
+            </a:extLst>
+          </p:cNvPr>
+          <p:cNvSpPr/>
+          <p:nvPr/>
+        </p:nvSpPr>
+        <p:spPr>
+          <a:xfrm>
+            <a:off x="3692172" y="3950639"/>
+            <a:ext cx="529389" cy="164910"/>
+          </a:xfrm>
+          <a:prstGeom prst="roundRect">
+            <a:avLst/>
+          </a:prstGeom>
+          <a:solidFill>
+            <a:srgbClr val="FF0000"/>
+          </a:solidFill>
+          <a:ln>
+            <a:noFill/>
+          </a:ln>
+        </p:spPr>
+        <p:style>
+          <a:lnRef idx="2">
+            <a:schemeClr val="accent4">
+              <a:shade val="50000"/>
+            </a:schemeClr>
+          </a:lnRef>
+          <a:fillRef idx="1">
+            <a:schemeClr val="accent4"/>
+          </a:fillRef>
+          <a:effectRef idx="0">
+            <a:schemeClr val="accent4"/>
+          </a:effectRef>
+          <a:fontRef idx="minor">
+            <a:schemeClr val="lt1"/>
+          </a:fontRef>
+        </p:style>
+        <p:txBody>
+          <a:bodyPr lIns="0" tIns="0" rIns="0" bIns="0" rtlCol="0" anchor="ctr"/>
+          <a:lstStyle/>
+          <a:p>
+            <a:pPr algn="ctr"/>
+            <a:r>
+              <a:rPr lang="en-EG" sz="900" dirty="0"/>
+              <a:t>Element</a:t>
+            </a:r>
+          </a:p>
+        </p:txBody>
+      </p:sp>
+      <p:sp>
+        <p:nvSpPr>
+          <p:cNvPr id="95" name="Rounded Rectangle 94">
+            <a:extLst>
+              <a:ext uri="{FF2B5EF4-FFF2-40B4-BE49-F238E27FC236}">
+                <a16:creationId xmlns:a16="http://schemas.microsoft.com/office/drawing/2014/main" id="{FAB453D1-03BF-5BCF-8ECB-F71B5DDD377C}"/>
+              </a:ext>
+            </a:extLst>
+          </p:cNvPr>
+          <p:cNvSpPr/>
+          <p:nvPr/>
+        </p:nvSpPr>
+        <p:spPr>
+          <a:xfrm>
+            <a:off x="3680279" y="3765134"/>
+            <a:ext cx="724476" cy="164910"/>
+          </a:xfrm>
+          <a:prstGeom prst="roundRect">
+            <a:avLst/>
+          </a:prstGeom>
+          <a:solidFill>
+            <a:schemeClr val="accent2">
+              <a:lumMod val="75000"/>
+            </a:schemeClr>
+          </a:solidFill>
+          <a:ln>
+            <a:noFill/>
+          </a:ln>
+        </p:spPr>
+        <p:style>
+          <a:lnRef idx="2">
+            <a:schemeClr val="accent4">
+              <a:shade val="50000"/>
+            </a:schemeClr>
+          </a:lnRef>
+          <a:fillRef idx="1">
+            <a:schemeClr val="accent4"/>
+          </a:fillRef>
+          <a:effectRef idx="0">
+            <a:schemeClr val="accent4"/>
+          </a:effectRef>
+          <a:fontRef idx="minor">
+            <a:schemeClr val="lt1"/>
+          </a:fontRef>
+        </p:style>
+        <p:txBody>
+          <a:bodyPr lIns="0" tIns="0" rIns="0" bIns="0" rtlCol="0" anchor="ctr"/>
+          <a:lstStyle/>
+          <a:p>
+            <a:pPr algn="ctr"/>
+            <a:r>
+              <a:rPr lang="en-EG" sz="900" dirty="0"/>
+              <a:t>elementHTML</a:t>
+            </a:r>
+          </a:p>
+        </p:txBody>
+      </p:sp>
       <p:sp>
         <p:nvSpPr>
           <p:cNvPr id="96" name="Right Arrow 95">

</xml_diff>